<commit_message>
V2 totally different from V1
Signed-off-by: CemAku <mehmet.cem@student.htw-berlin.de>
</commit_message>
<xml_diff>
--- a/Presentations/Sprint3 - Data Understanding & Data Preparation - Cem.pptx
+++ b/Presentations/Sprint3 - Data Understanding & Data Preparation - Cem.pptx
@@ -7929,7 +7929,7 @@
         </p:nvSpPr>
         <p:spPr>
           <a:xfrm>
-            <a:off x="6617472" y="3075166"/>
+            <a:off x="5757509" y="2571750"/>
             <a:ext cx="1888496" cy="1739715"/>
           </a:xfrm>
           <a:prstGeom prst="ellipse">
@@ -13429,10 +13429,10 @@
                   <a:cs typeface="Rajdhani"/>
                   <a:sym typeface="Rajdhani"/>
                 </a:rPr>
-                <a:t>Data </a:t>
+                <a:t>Data Organi</a:t>
               </a:r>
               <a:r>
-                <a:rPr lang="tr-TR" sz="2400" b="1" dirty="0" err="1">
+                <a:rPr lang="en-US" sz="2400" b="1" dirty="0">
                   <a:solidFill>
                     <a:schemeClr val="lt2"/>
                   </a:solidFill>
@@ -13441,7 +13441,19 @@
                   <a:cs typeface="Rajdhani"/>
                   <a:sym typeface="Rajdhani"/>
                 </a:rPr>
-                <a:t>Organization</a:t>
+                <a:t>s</a:t>
+              </a:r>
+              <a:r>
+                <a:rPr lang="tr-TR" sz="2400" b="1" dirty="0">
+                  <a:solidFill>
+                    <a:schemeClr val="lt2"/>
+                  </a:solidFill>
+                  <a:latin typeface="Rajdhani"/>
+                  <a:ea typeface="Rajdhani"/>
+                  <a:cs typeface="Rajdhani"/>
+                  <a:sym typeface="Rajdhani"/>
+                </a:rPr>
+                <a:t>ation</a:t>
               </a:r>
               <a:endParaRPr sz="2400" b="1" dirty="0">
                 <a:solidFill>
@@ -14763,6 +14775,18 @@
                 <a:buNone/>
               </a:pPr>
               <a:r>
+                <a:rPr lang="en-US" sz="1200" dirty="0">
+                  <a:solidFill>
+                    <a:schemeClr val="lt2"/>
+                  </a:solidFill>
+                  <a:latin typeface="Fira Sans Condensed"/>
+                  <a:ea typeface="Fira Sans Condensed"/>
+                  <a:cs typeface="Fira Sans Condensed"/>
+                  <a:sym typeface="Fira Sans Condensed"/>
+                </a:rPr>
+                <a:t>6</a:t>
+              </a:r>
+              <a:r>
                 <a:rPr lang="tr-TR" sz="1200" dirty="0">
                   <a:solidFill>
                     <a:schemeClr val="lt2"/>
@@ -14772,19 +14796,7 @@
                   <a:cs typeface="Fira Sans Condensed"/>
                   <a:sym typeface="Fira Sans Condensed"/>
                 </a:rPr>
-                <a:t>5 </a:t>
-              </a:r>
-              <a:r>
-                <a:rPr lang="tr-TR" sz="1200" dirty="0" err="1">
-                  <a:solidFill>
-                    <a:schemeClr val="lt2"/>
-                  </a:solidFill>
-                  <a:latin typeface="Fira Sans Condensed"/>
-                  <a:ea typeface="Fira Sans Condensed"/>
-                  <a:cs typeface="Fira Sans Condensed"/>
-                  <a:sym typeface="Fira Sans Condensed"/>
-                </a:rPr>
-                <a:t>Constant</a:t>
+                <a:t> Constant</a:t>
               </a:r>
               <a:endParaRPr sz="1200" dirty="0">
                 <a:solidFill>

</xml_diff>